<commit_message>
modify ppt of Lecture12
</commit_message>
<xml_diff>
--- a/python/Lecture12/第一阶段总结和训练191116.pptx
+++ b/python/Lecture12/第一阶段总结和训练191116.pptx
@@ -5,7 +5,7 @@
     <p:sldMasterId id="2147483648" r:id="rId1"/>
   </p:sldMasterIdLst>
   <p:notesMasterIdLst>
-    <p:notesMasterId r:id="rId9"/>
+    <p:notesMasterId r:id="rId11"/>
   </p:notesMasterIdLst>
   <p:sldIdLst>
     <p:sldId id="256" r:id="rId2"/>
@@ -14,7 +14,9 @@
     <p:sldId id="259" r:id="rId5"/>
     <p:sldId id="260" r:id="rId6"/>
     <p:sldId id="261" r:id="rId7"/>
-    <p:sldId id="262" r:id="rId8"/>
+    <p:sldId id="263" r:id="rId8"/>
+    <p:sldId id="264" r:id="rId9"/>
+    <p:sldId id="262" r:id="rId10"/>
   </p:sldIdLst>
   <p:sldSz cx="24384000" cy="13716000"/>
   <p:notesSz cx="6858000" cy="9144000"/>
@@ -2522,7 +2524,7 @@
           </a:ln>
           <a:extLst>
             <a:ext uri="{C572A759-6A51-4108-AA02-DFA0A04FC94B}">
-              <ma14:wrappingTextBoxFlag xmlns="" xmlns:m="http://schemas.openxmlformats.org/officeDocument/2006/math" xmlns:a14="http://schemas.microsoft.com/office/drawing/2010/main" xmlns:ma14="http://schemas.microsoft.com/office/mac/drawingml/2011/main" val="1"/>
+              <ma14:wrappingTextBoxFlag xmlns:ma14="http://schemas.microsoft.com/office/mac/drawingml/2011/main" xmlns:a14="http://schemas.microsoft.com/office/drawing/2010/main" xmlns:m="http://schemas.openxmlformats.org/officeDocument/2006/math" xmlns="" val="1"/>
             </a:ext>
           </a:extLst>
         </p:spPr>
@@ -2611,7 +2613,7 @@
           </a:ln>
           <a:extLst>
             <a:ext uri="{C572A759-6A51-4108-AA02-DFA0A04FC94B}">
-              <ma14:wrappingTextBoxFlag xmlns="" xmlns:m="http://schemas.openxmlformats.org/officeDocument/2006/math" xmlns:a14="http://schemas.microsoft.com/office/drawing/2010/main" xmlns:ma14="http://schemas.microsoft.com/office/mac/drawingml/2011/main" val="1"/>
+              <ma14:wrappingTextBoxFlag xmlns:ma14="http://schemas.microsoft.com/office/mac/drawingml/2011/main" xmlns:a14="http://schemas.microsoft.com/office/drawing/2010/main" xmlns:m="http://schemas.openxmlformats.org/officeDocument/2006/math" xmlns="" val="1"/>
             </a:ext>
           </a:extLst>
         </p:spPr>
@@ -3532,7 +3534,7 @@
           </a:ln>
           <a:extLst>
             <a:ext uri="{C572A759-6A51-4108-AA02-DFA0A04FC94B}">
-              <ma14:wrappingTextBoxFlag xmlns="" xmlns:m="http://schemas.openxmlformats.org/officeDocument/2006/math" xmlns:a14="http://schemas.microsoft.com/office/drawing/2010/main" xmlns:ma14="http://schemas.microsoft.com/office/mac/drawingml/2011/main" val="1"/>
+              <ma14:wrappingTextBoxFlag xmlns:ma14="http://schemas.microsoft.com/office/mac/drawingml/2011/main" xmlns:a14="http://schemas.microsoft.com/office/drawing/2010/main" xmlns:m="http://schemas.openxmlformats.org/officeDocument/2006/math" xmlns="" val="1"/>
             </a:ext>
           </a:extLst>
         </p:spPr>
@@ -4529,6 +4531,358 @@
 </file>
 
 <file path=ppt/slides/slide7.xml><?xml version="1.0" encoding="utf-8"?>
+<p:sld xmlns:a="http://schemas.openxmlformats.org/drawingml/2006/main" xmlns:r="http://schemas.openxmlformats.org/officeDocument/2006/relationships" xmlns:p="http://schemas.openxmlformats.org/presentationml/2006/main">
+  <p:cSld>
+    <p:spTree>
+      <p:nvGrpSpPr>
+        <p:cNvPr id="1" name=""/>
+        <p:cNvGrpSpPr/>
+        <p:nvPr/>
+      </p:nvGrpSpPr>
+      <p:grpSpPr>
+        <a:xfrm>
+          <a:off x="0" y="0"/>
+          <a:ext cx="0" cy="0"/>
+          <a:chOff x="0" y="0"/>
+          <a:chExt cx="0" cy="0"/>
+        </a:xfrm>
+      </p:grpSpPr>
+      <p:sp>
+        <p:nvSpPr>
+          <p:cNvPr id="2" name="标题 1">
+            <a:extLst>
+              <a:ext uri="{FF2B5EF4-FFF2-40B4-BE49-F238E27FC236}">
+                <a16:creationId xmlns:a16="http://schemas.microsoft.com/office/drawing/2014/main" id="{3014729E-5C52-E74C-B841-E1F95383023D}"/>
+              </a:ext>
+            </a:extLst>
+          </p:cNvPr>
+          <p:cNvSpPr>
+            <a:spLocks noGrp="1"/>
+          </p:cNvSpPr>
+          <p:nvPr>
+            <p:ph type="title"/>
+          </p:nvPr>
+        </p:nvSpPr>
+        <p:spPr/>
+        <p:txBody>
+          <a:bodyPr/>
+          <a:lstStyle/>
+          <a:p>
+            <a:r>
+              <a:rPr kumimoji="1" lang="zh-CN" altLang="en-US" dirty="0"/>
+              <a:t>提示</a:t>
+            </a:r>
+            <a:r>
+              <a:rPr kumimoji="1" lang="en-US" altLang="zh-CN" dirty="0"/>
+              <a:t>1</a:t>
+            </a:r>
+            <a:endParaRPr kumimoji="1" lang="zh-CN" altLang="en-US" dirty="0"/>
+          </a:p>
+        </p:txBody>
+      </p:sp>
+      <p:sp>
+        <p:nvSpPr>
+          <p:cNvPr id="4" name="文本框 3">
+            <a:extLst>
+              <a:ext uri="{FF2B5EF4-FFF2-40B4-BE49-F238E27FC236}">
+                <a16:creationId xmlns:a16="http://schemas.microsoft.com/office/drawing/2014/main" id="{6D881030-3E48-B442-B389-13B035B11BAD}"/>
+              </a:ext>
+            </a:extLst>
+          </p:cNvPr>
+          <p:cNvSpPr txBox="1"/>
+          <p:nvPr/>
+        </p:nvSpPr>
+        <p:spPr>
+          <a:xfrm>
+            <a:off x="1165860" y="5248860"/>
+            <a:ext cx="15316200" cy="3949799"/>
+          </a:xfrm>
+          <a:prstGeom prst="rect">
+            <a:avLst/>
+          </a:prstGeom>
+          <a:noFill/>
+          <a:ln w="12700" cap="flat">
+            <a:noFill/>
+            <a:miter lim="400000"/>
+          </a:ln>
+          <a:effectLst/>
+          <a:sp3d/>
+        </p:spPr>
+        <p:style>
+          <a:lnRef idx="0">
+            <a:scrgbClr r="0" g="0" b="0"/>
+          </a:lnRef>
+          <a:fillRef idx="0">
+            <a:scrgbClr r="0" g="0" b="0"/>
+          </a:fillRef>
+          <a:effectRef idx="0">
+            <a:scrgbClr r="0" g="0" b="0"/>
+          </a:effectRef>
+          <a:fontRef idx="none"/>
+        </p:style>
+        <p:txBody>
+          <a:bodyPr rot="0" spcFirstLastPara="1" vertOverflow="overflow" horzOverflow="overflow" vert="horz" wrap="square" lIns="50800" tIns="50800" rIns="50800" bIns="50800" numCol="1" spcCol="38100" rtlCol="0" anchor="ctr">
+            <a:spAutoFit/>
+          </a:bodyPr>
+          <a:lstStyle/>
+          <a:p>
+            <a:pPr algn="l"/>
+            <a:r>
+              <a:rPr lang="en" altLang="zh-CN" dirty="0"/>
+              <a:t>f = open('</a:t>
+            </a:r>
+            <a:r>
+              <a:rPr lang="en" altLang="zh-CN" dirty="0" err="1"/>
+              <a:t>scores.txt','r</a:t>
+            </a:r>
+            <a:r>
+              <a:rPr lang="en" altLang="zh-CN" dirty="0"/>
+              <a:t>')</a:t>
+            </a:r>
+          </a:p>
+          <a:p>
+            <a:pPr algn="l"/>
+            <a:r>
+              <a:rPr lang="en" altLang="zh-CN" dirty="0" err="1"/>
+              <a:t>alist</a:t>
+            </a:r>
+            <a:r>
+              <a:rPr lang="en" altLang="zh-CN" dirty="0"/>
+              <a:t> = []</a:t>
+            </a:r>
+          </a:p>
+          <a:p>
+            <a:pPr algn="l"/>
+            <a:r>
+              <a:rPr lang="en" altLang="zh-CN" dirty="0"/>
+              <a:t>for line in </a:t>
+            </a:r>
+            <a:r>
+              <a:rPr lang="en" altLang="zh-CN" dirty="0" err="1"/>
+              <a:t>f.readlines</a:t>
+            </a:r>
+            <a:r>
+              <a:rPr lang="en" altLang="zh-CN" dirty="0"/>
+              <a:t>():</a:t>
+            </a:r>
+          </a:p>
+          <a:p>
+            <a:pPr algn="l"/>
+            <a:r>
+              <a:rPr lang="en" altLang="zh-CN" dirty="0"/>
+              <a:t>	</a:t>
+            </a:r>
+            <a:r>
+              <a:rPr lang="en" altLang="zh-CN" dirty="0" err="1"/>
+              <a:t>alist.append</a:t>
+            </a:r>
+            <a:r>
+              <a:rPr lang="en" altLang="zh-CN" dirty="0"/>
+              <a:t>(line)</a:t>
+            </a:r>
+          </a:p>
+          <a:p>
+            <a:pPr algn="l"/>
+            <a:r>
+              <a:rPr lang="en" altLang="zh-CN" dirty="0" err="1"/>
+              <a:t>f.close</a:t>
+            </a:r>
+            <a:r>
+              <a:rPr lang="en" altLang="zh-CN" dirty="0"/>
+              <a:t>()</a:t>
+            </a:r>
+            <a:endParaRPr kumimoji="0" lang="zh-CN" altLang="en-US" sz="5000" b="0" i="0" u="none" strike="noStrike" cap="none" spc="0" normalizeH="0" baseline="0" dirty="0">
+              <a:ln>
+                <a:noFill/>
+              </a:ln>
+              <a:solidFill>
+                <a:srgbClr val="606060"/>
+              </a:solidFill>
+              <a:effectLst/>
+              <a:uFillTx/>
+              <a:latin typeface="+mn-lt"/>
+              <a:ea typeface="+mn-ea"/>
+              <a:cs typeface="+mn-cs"/>
+              <a:sym typeface="Gill Sans"/>
+            </a:endParaRPr>
+          </a:p>
+        </p:txBody>
+      </p:sp>
+    </p:spTree>
+    <p:extLst>
+      <p:ext uri="{BB962C8B-B14F-4D97-AF65-F5344CB8AC3E}">
+        <p14:creationId xmlns:p14="http://schemas.microsoft.com/office/powerpoint/2010/main" val="1511026771"/>
+      </p:ext>
+    </p:extLst>
+  </p:cSld>
+  <p:clrMapOvr>
+    <a:masterClrMapping/>
+  </p:clrMapOvr>
+  <p:transition spd="med"/>
+</p:sld>
+</file>
+
+<file path=ppt/slides/slide8.xml><?xml version="1.0" encoding="utf-8"?>
+<p:sld xmlns:a="http://schemas.openxmlformats.org/drawingml/2006/main" xmlns:r="http://schemas.openxmlformats.org/officeDocument/2006/relationships" xmlns:p="http://schemas.openxmlformats.org/presentationml/2006/main">
+  <p:cSld>
+    <p:spTree>
+      <p:nvGrpSpPr>
+        <p:cNvPr id="1" name=""/>
+        <p:cNvGrpSpPr/>
+        <p:nvPr/>
+      </p:nvGrpSpPr>
+      <p:grpSpPr>
+        <a:xfrm>
+          <a:off x="0" y="0"/>
+          <a:ext cx="0" cy="0"/>
+          <a:chOff x="0" y="0"/>
+          <a:chExt cx="0" cy="0"/>
+        </a:xfrm>
+      </p:grpSpPr>
+      <p:sp>
+        <p:nvSpPr>
+          <p:cNvPr id="2" name="标题 1">
+            <a:extLst>
+              <a:ext uri="{FF2B5EF4-FFF2-40B4-BE49-F238E27FC236}">
+                <a16:creationId xmlns:a16="http://schemas.microsoft.com/office/drawing/2014/main" id="{D4756B3E-0839-1D40-83F0-10A69B688393}"/>
+              </a:ext>
+            </a:extLst>
+          </p:cNvPr>
+          <p:cNvSpPr>
+            <a:spLocks noGrp="1"/>
+          </p:cNvSpPr>
+          <p:nvPr>
+            <p:ph type="title"/>
+          </p:nvPr>
+        </p:nvSpPr>
+        <p:spPr/>
+        <p:txBody>
+          <a:bodyPr/>
+          <a:lstStyle/>
+          <a:p>
+            <a:r>
+              <a:rPr kumimoji="1" lang="zh-CN" altLang="en-US" dirty="0"/>
+              <a:t>提示</a:t>
+            </a:r>
+            <a:r>
+              <a:rPr kumimoji="1" lang="en-US" altLang="zh-CN" dirty="0"/>
+              <a:t>2</a:t>
+            </a:r>
+            <a:endParaRPr kumimoji="1" lang="zh-CN" altLang="en-US" dirty="0"/>
+          </a:p>
+        </p:txBody>
+      </p:sp>
+      <p:sp>
+        <p:nvSpPr>
+          <p:cNvPr id="3" name="文本占位符 2">
+            <a:extLst>
+              <a:ext uri="{FF2B5EF4-FFF2-40B4-BE49-F238E27FC236}">
+                <a16:creationId xmlns:a16="http://schemas.microsoft.com/office/drawing/2014/main" id="{956E9E8C-26A3-7B43-BE19-A630B92AAE24}"/>
+              </a:ext>
+            </a:extLst>
+          </p:cNvPr>
+          <p:cNvSpPr>
+            <a:spLocks noGrp="1"/>
+          </p:cNvSpPr>
+          <p:nvPr>
+            <p:ph type="body" idx="1"/>
+          </p:nvPr>
+        </p:nvSpPr>
+        <p:spPr/>
+        <p:txBody>
+          <a:bodyPr>
+            <a:normAutofit lnSpcReduction="10000"/>
+          </a:bodyPr>
+          <a:lstStyle/>
+          <a:p>
+            <a:pPr marL="0" indent="0">
+              <a:buNone/>
+            </a:pPr>
+            <a:r>
+              <a:rPr kumimoji="1" lang="en" altLang="zh-CN" dirty="0"/>
+              <a:t>if A &gt; B :</a:t>
+            </a:r>
+          </a:p>
+          <a:p>
+            <a:pPr marL="0" indent="0">
+              <a:buNone/>
+            </a:pPr>
+            <a:r>
+              <a:rPr kumimoji="1" lang="en" altLang="zh-CN" dirty="0"/>
+              <a:t>	</a:t>
+            </a:r>
+            <a:r>
+              <a:rPr kumimoji="1" lang="zh-CN" altLang="en-US" dirty="0"/>
+              <a:t>******</a:t>
+            </a:r>
+            <a:endParaRPr kumimoji="1" lang="en" altLang="zh-CN" dirty="0"/>
+          </a:p>
+          <a:p>
+            <a:pPr marL="0" indent="0">
+              <a:buNone/>
+            </a:pPr>
+            <a:r>
+              <a:rPr kumimoji="1" lang="en" altLang="zh-CN" dirty="0" err="1"/>
+              <a:t>elif</a:t>
+            </a:r>
+            <a:r>
+              <a:rPr kumimoji="1" lang="en" altLang="zh-CN" dirty="0"/>
+              <a:t> A &lt; B :</a:t>
+            </a:r>
+          </a:p>
+          <a:p>
+            <a:pPr marL="0" indent="0">
+              <a:buNone/>
+            </a:pPr>
+            <a:r>
+              <a:rPr kumimoji="1" lang="en" altLang="zh-CN" dirty="0"/>
+              <a:t>	</a:t>
+            </a:r>
+            <a:r>
+              <a:rPr kumimoji="1" lang="zh-CN" altLang="en-US" dirty="0"/>
+              <a:t>******</a:t>
+            </a:r>
+            <a:endParaRPr kumimoji="1" lang="en" altLang="zh-CN" dirty="0"/>
+          </a:p>
+          <a:p>
+            <a:pPr marL="0" indent="0">
+              <a:buNone/>
+            </a:pPr>
+            <a:r>
+              <a:rPr kumimoji="1" lang="en" altLang="zh-CN" dirty="0"/>
+              <a:t>else:</a:t>
+            </a:r>
+          </a:p>
+          <a:p>
+            <a:pPr marL="0" indent="0">
+              <a:buNone/>
+            </a:pPr>
+            <a:r>
+              <a:rPr kumimoji="1" lang="en" altLang="zh-CN" dirty="0"/>
+              <a:t>	</a:t>
+            </a:r>
+            <a:r>
+              <a:rPr kumimoji="1" lang="zh-CN" altLang="en-US" dirty="0"/>
+              <a:t>******</a:t>
+            </a:r>
+          </a:p>
+        </p:txBody>
+      </p:sp>
+    </p:spTree>
+    <p:extLst>
+      <p:ext uri="{BB962C8B-B14F-4D97-AF65-F5344CB8AC3E}">
+        <p14:creationId xmlns:p14="http://schemas.microsoft.com/office/powerpoint/2010/main" val="422549163"/>
+      </p:ext>
+    </p:extLst>
+  </p:cSld>
+  <p:clrMapOvr>
+    <a:masterClrMapping/>
+  </p:clrMapOvr>
+  <p:transition spd="med"/>
+</p:sld>
+</file>
+
+<file path=ppt/slides/slide9.xml><?xml version="1.0" encoding="utf-8"?>
 <p:sld xmlns:a="http://schemas.openxmlformats.org/drawingml/2006/main" xmlns:r="http://schemas.openxmlformats.org/officeDocument/2006/relationships" xmlns:p="http://schemas.openxmlformats.org/presentationml/2006/main">
   <p:cSld>
     <p:spTree>

</xml_diff>